<commit_message>
#21-02 - done the query for authorizations
</commit_message>
<xml_diff>
--- a/docs/screens/sreens.pptx
+++ b/docs/screens/sreens.pptx
@@ -256,7 +256,7 @@
           <a:p>
             <a:fld id="{3F95A33F-0BE4-4972-96C4-351B17A890F5}" type="datetimeFigureOut">
               <a:rPr lang="en-US" smtClean="0"/>
-              <a:t>1/28/2019</a:t>
+              <a:t>2/21/2019</a:t>
             </a:fld>
             <a:endParaRPr lang="en-US"/>
           </a:p>
@@ -424,7 +424,7 @@
           <a:p>
             <a:fld id="{3F95A33F-0BE4-4972-96C4-351B17A890F5}" type="datetimeFigureOut">
               <a:rPr lang="en-US" smtClean="0"/>
-              <a:t>1/28/2019</a:t>
+              <a:t>2/21/2019</a:t>
             </a:fld>
             <a:endParaRPr lang="en-US"/>
           </a:p>
@@ -602,7 +602,7 @@
           <a:p>
             <a:fld id="{3F95A33F-0BE4-4972-96C4-351B17A890F5}" type="datetimeFigureOut">
               <a:rPr lang="en-US" smtClean="0"/>
-              <a:t>1/28/2019</a:t>
+              <a:t>2/21/2019</a:t>
             </a:fld>
             <a:endParaRPr lang="en-US"/>
           </a:p>
@@ -770,7 +770,7 @@
           <a:p>
             <a:fld id="{3F95A33F-0BE4-4972-96C4-351B17A890F5}" type="datetimeFigureOut">
               <a:rPr lang="en-US" smtClean="0"/>
-              <a:t>1/28/2019</a:t>
+              <a:t>2/21/2019</a:t>
             </a:fld>
             <a:endParaRPr lang="en-US"/>
           </a:p>
@@ -1015,7 +1015,7 @@
           <a:p>
             <a:fld id="{3F95A33F-0BE4-4972-96C4-351B17A890F5}" type="datetimeFigureOut">
               <a:rPr lang="en-US" smtClean="0"/>
-              <a:t>1/28/2019</a:t>
+              <a:t>2/21/2019</a:t>
             </a:fld>
             <a:endParaRPr lang="en-US"/>
           </a:p>
@@ -1244,7 +1244,7 @@
           <a:p>
             <a:fld id="{3F95A33F-0BE4-4972-96C4-351B17A890F5}" type="datetimeFigureOut">
               <a:rPr lang="en-US" smtClean="0"/>
-              <a:t>1/28/2019</a:t>
+              <a:t>2/21/2019</a:t>
             </a:fld>
             <a:endParaRPr lang="en-US"/>
           </a:p>
@@ -1608,7 +1608,7 @@
           <a:p>
             <a:fld id="{3F95A33F-0BE4-4972-96C4-351B17A890F5}" type="datetimeFigureOut">
               <a:rPr lang="en-US" smtClean="0"/>
-              <a:t>1/28/2019</a:t>
+              <a:t>2/21/2019</a:t>
             </a:fld>
             <a:endParaRPr lang="en-US"/>
           </a:p>
@@ -1725,7 +1725,7 @@
           <a:p>
             <a:fld id="{3F95A33F-0BE4-4972-96C4-351B17A890F5}" type="datetimeFigureOut">
               <a:rPr lang="en-US" smtClean="0"/>
-              <a:t>1/28/2019</a:t>
+              <a:t>2/21/2019</a:t>
             </a:fld>
             <a:endParaRPr lang="en-US"/>
           </a:p>
@@ -1820,7 +1820,7 @@
           <a:p>
             <a:fld id="{3F95A33F-0BE4-4972-96C4-351B17A890F5}" type="datetimeFigureOut">
               <a:rPr lang="en-US" smtClean="0"/>
-              <a:t>1/28/2019</a:t>
+              <a:t>2/21/2019</a:t>
             </a:fld>
             <a:endParaRPr lang="en-US"/>
           </a:p>
@@ -2095,7 +2095,7 @@
           <a:p>
             <a:fld id="{3F95A33F-0BE4-4972-96C4-351B17A890F5}" type="datetimeFigureOut">
               <a:rPr lang="en-US" smtClean="0"/>
-              <a:t>1/28/2019</a:t>
+              <a:t>2/21/2019</a:t>
             </a:fld>
             <a:endParaRPr lang="en-US"/>
           </a:p>
@@ -2347,7 +2347,7 @@
           <a:p>
             <a:fld id="{3F95A33F-0BE4-4972-96C4-351B17A890F5}" type="datetimeFigureOut">
               <a:rPr lang="en-US" smtClean="0"/>
-              <a:t>1/28/2019</a:t>
+              <a:t>2/21/2019</a:t>
             </a:fld>
             <a:endParaRPr lang="en-US"/>
           </a:p>
@@ -2558,7 +2558,7 @@
           <a:p>
             <a:fld id="{3F95A33F-0BE4-4972-96C4-351B17A890F5}" type="datetimeFigureOut">
               <a:rPr lang="en-US" smtClean="0"/>
-              <a:t>1/28/2019</a:t>
+              <a:t>2/21/2019</a:t>
             </a:fld>
             <a:endParaRPr lang="en-US"/>
           </a:p>
@@ -6307,53 +6307,6 @@
       </p:sp>
       <p:sp>
         <p:nvSpPr>
-          <p:cNvPr id="11" name="Rectangle 10">
-            <a:extLst>
-              <a:ext uri="{FF2B5EF4-FFF2-40B4-BE49-F238E27FC236}">
-                <a16:creationId xmlns:a16="http://schemas.microsoft.com/office/drawing/2014/main" id="{C7FF2387-9D28-4BCA-9A73-D405644BC1C1}"/>
-              </a:ext>
-            </a:extLst>
-          </p:cNvPr>
-          <p:cNvSpPr/>
-          <p:nvPr/>
-        </p:nvSpPr>
-        <p:spPr>
-          <a:xfrm>
-            <a:off x="5631870" y="1200724"/>
-            <a:ext cx="1590966" cy="375213"/>
-          </a:xfrm>
-          <a:prstGeom prst="rect">
-            <a:avLst/>
-          </a:prstGeom>
-        </p:spPr>
-        <p:style>
-          <a:lnRef idx="2">
-            <a:schemeClr val="accent6"/>
-          </a:lnRef>
-          <a:fillRef idx="1">
-            <a:schemeClr val="lt1"/>
-          </a:fillRef>
-          <a:effectRef idx="0">
-            <a:schemeClr val="accent6"/>
-          </a:effectRef>
-          <a:fontRef idx="minor">
-            <a:schemeClr val="dk1"/>
-          </a:fontRef>
-        </p:style>
-        <p:txBody>
-          <a:bodyPr rtlCol="0" anchor="ctr"/>
-          <a:lstStyle/>
-          <a:p>
-            <a:pPr algn="ctr"/>
-            <a:r>
-              <a:rPr lang="en-US" sz="1400"/>
-              <a:t>Provider ID</a:t>
-            </a:r>
-          </a:p>
-        </p:txBody>
-      </p:sp>
-      <p:sp>
-        <p:nvSpPr>
           <p:cNvPr id="12" name="Rectangle 11">
             <a:extLst>
               <a:ext uri="{FF2B5EF4-FFF2-40B4-BE49-F238E27FC236}">
@@ -6619,50 +6572,6 @@
           </a:effectRef>
           <a:fontRef idx="minor">
             <a:schemeClr val="lt1"/>
-          </a:fontRef>
-        </p:style>
-        <p:txBody>
-          <a:bodyPr rtlCol="0" anchor="ctr"/>
-          <a:lstStyle/>
-          <a:p>
-            <a:pPr algn="ctr"/>
-            <a:endParaRPr lang="en-US"/>
-          </a:p>
-        </p:txBody>
-      </p:sp>
-      <p:sp>
-        <p:nvSpPr>
-          <p:cNvPr id="18" name="Rectangle 17">
-            <a:extLst>
-              <a:ext uri="{FF2B5EF4-FFF2-40B4-BE49-F238E27FC236}">
-                <a16:creationId xmlns:a16="http://schemas.microsoft.com/office/drawing/2014/main" id="{CC900875-9094-414F-800C-ED9618E8058F}"/>
-              </a:ext>
-            </a:extLst>
-          </p:cNvPr>
-          <p:cNvSpPr/>
-          <p:nvPr/>
-        </p:nvSpPr>
-        <p:spPr>
-          <a:xfrm>
-            <a:off x="7659256" y="1200725"/>
-            <a:ext cx="1856600" cy="347506"/>
-          </a:xfrm>
-          <a:prstGeom prst="rect">
-            <a:avLst/>
-          </a:prstGeom>
-        </p:spPr>
-        <p:style>
-          <a:lnRef idx="1">
-            <a:schemeClr val="accent3"/>
-          </a:lnRef>
-          <a:fillRef idx="2">
-            <a:schemeClr val="accent3"/>
-          </a:fillRef>
-          <a:effectRef idx="1">
-            <a:schemeClr val="accent3"/>
-          </a:effectRef>
-          <a:fontRef idx="minor">
-            <a:schemeClr val="dk1"/>
           </a:fontRef>
         </p:style>
         <p:txBody>
@@ -9663,6 +9572,97 @@
           </a:p>
         </p:txBody>
       </p:sp>
+      <p:sp>
+        <p:nvSpPr>
+          <p:cNvPr id="76" name="Rectangle 75">
+            <a:extLst>
+              <a:ext uri="{FF2B5EF4-FFF2-40B4-BE49-F238E27FC236}">
+                <a16:creationId xmlns:a16="http://schemas.microsoft.com/office/drawing/2014/main" id="{0690EC9D-D718-4CEA-999B-0D6FFA9A55CE}"/>
+              </a:ext>
+            </a:extLst>
+          </p:cNvPr>
+          <p:cNvSpPr/>
+          <p:nvPr/>
+        </p:nvSpPr>
+        <p:spPr>
+          <a:xfrm>
+            <a:off x="5643413" y="1163943"/>
+            <a:ext cx="1590968" cy="375213"/>
+          </a:xfrm>
+          <a:prstGeom prst="rect">
+            <a:avLst/>
+          </a:prstGeom>
+        </p:spPr>
+        <p:style>
+          <a:lnRef idx="2">
+            <a:schemeClr val="accent6"/>
+          </a:lnRef>
+          <a:fillRef idx="1">
+            <a:schemeClr val="lt1"/>
+          </a:fillRef>
+          <a:effectRef idx="0">
+            <a:schemeClr val="accent6"/>
+          </a:effectRef>
+          <a:fontRef idx="minor">
+            <a:schemeClr val="dk1"/>
+          </a:fontRef>
+        </p:style>
+        <p:txBody>
+          <a:bodyPr rtlCol="0" anchor="ctr"/>
+          <a:lstStyle/>
+          <a:p>
+            <a:pPr algn="ctr"/>
+            <a:r>
+              <a:rPr lang="en-US" sz="1400"/>
+              <a:t>Provider ID</a:t>
+            </a:r>
+          </a:p>
+        </p:txBody>
+      </p:sp>
+      <p:sp>
+        <p:nvSpPr>
+          <p:cNvPr id="77" name="Rectangle 76">
+            <a:extLst>
+              <a:ext uri="{FF2B5EF4-FFF2-40B4-BE49-F238E27FC236}">
+                <a16:creationId xmlns:a16="http://schemas.microsoft.com/office/drawing/2014/main" id="{933B76A8-35FB-4CBC-9D02-E40CE4B5D81B}"/>
+              </a:ext>
+            </a:extLst>
+          </p:cNvPr>
+          <p:cNvSpPr/>
+          <p:nvPr/>
+        </p:nvSpPr>
+        <p:spPr>
+          <a:xfrm>
+            <a:off x="7670801" y="1167527"/>
+            <a:ext cx="1847190" cy="359210"/>
+          </a:xfrm>
+          <a:prstGeom prst="rect">
+            <a:avLst/>
+          </a:prstGeom>
+        </p:spPr>
+        <p:style>
+          <a:lnRef idx="1">
+            <a:schemeClr val="accent3"/>
+          </a:lnRef>
+          <a:fillRef idx="2">
+            <a:schemeClr val="accent3"/>
+          </a:fillRef>
+          <a:effectRef idx="1">
+            <a:schemeClr val="accent3"/>
+          </a:effectRef>
+          <a:fontRef idx="minor">
+            <a:schemeClr val="dk1"/>
+          </a:fontRef>
+        </p:style>
+        <p:txBody>
+          <a:bodyPr rtlCol="0" anchor="ctr"/>
+          <a:lstStyle/>
+          <a:p>
+            <a:pPr algn="ctr"/>
+            <a:endParaRPr lang="en-US"/>
+          </a:p>
+        </p:txBody>
+      </p:sp>
     </p:spTree>
     <p:extLst>
       <p:ext uri="{BB962C8B-B14F-4D97-AF65-F5344CB8AC3E}">

</xml_diff>